<commit_message>
Fixed doc for enPamGb and DeepCpf1
</commit_message>
<xml_diff>
--- a/vignettes/figures/sequences_cas12a.pptx
+++ b/vignettes/figures/sequences_cas12a.pptx
@@ -243,7 +243,7 @@
           <a:p>
             <a:fld id="{DD6D9246-4FED-8E4D-BC9B-CDD794F2A5B7}" type="datetimeFigureOut">
               <a:rPr lang="en-US" smtClean="0"/>
-              <a:t>1/8/21</a:t>
+              <a:t>10/3/24</a:t>
             </a:fld>
             <a:endParaRPr lang="en-US"/>
           </a:p>
@@ -413,7 +413,7 @@
           <a:p>
             <a:fld id="{DD6D9246-4FED-8E4D-BC9B-CDD794F2A5B7}" type="datetimeFigureOut">
               <a:rPr lang="en-US" smtClean="0"/>
-              <a:t>1/8/21</a:t>
+              <a:t>10/3/24</a:t>
             </a:fld>
             <a:endParaRPr lang="en-US"/>
           </a:p>
@@ -593,7 +593,7 @@
           <a:p>
             <a:fld id="{DD6D9246-4FED-8E4D-BC9B-CDD794F2A5B7}" type="datetimeFigureOut">
               <a:rPr lang="en-US" smtClean="0"/>
-              <a:t>1/8/21</a:t>
+              <a:t>10/3/24</a:t>
             </a:fld>
             <a:endParaRPr lang="en-US"/>
           </a:p>
@@ -763,7 +763,7 @@
           <a:p>
             <a:fld id="{DD6D9246-4FED-8E4D-BC9B-CDD794F2A5B7}" type="datetimeFigureOut">
               <a:rPr lang="en-US" smtClean="0"/>
-              <a:t>1/8/21</a:t>
+              <a:t>10/3/24</a:t>
             </a:fld>
             <a:endParaRPr lang="en-US"/>
           </a:p>
@@ -1009,7 +1009,7 @@
           <a:p>
             <a:fld id="{DD6D9246-4FED-8E4D-BC9B-CDD794F2A5B7}" type="datetimeFigureOut">
               <a:rPr lang="en-US" smtClean="0"/>
-              <a:t>1/8/21</a:t>
+              <a:t>10/3/24</a:t>
             </a:fld>
             <a:endParaRPr lang="en-US"/>
           </a:p>
@@ -1241,7 +1241,7 @@
           <a:p>
             <a:fld id="{DD6D9246-4FED-8E4D-BC9B-CDD794F2A5B7}" type="datetimeFigureOut">
               <a:rPr lang="en-US" smtClean="0"/>
-              <a:t>1/8/21</a:t>
+              <a:t>10/3/24</a:t>
             </a:fld>
             <a:endParaRPr lang="en-US"/>
           </a:p>
@@ -1608,7 +1608,7 @@
           <a:p>
             <a:fld id="{DD6D9246-4FED-8E4D-BC9B-CDD794F2A5B7}" type="datetimeFigureOut">
               <a:rPr lang="en-US" smtClean="0"/>
-              <a:t>1/8/21</a:t>
+              <a:t>10/3/24</a:t>
             </a:fld>
             <a:endParaRPr lang="en-US"/>
           </a:p>
@@ -1726,7 +1726,7 @@
           <a:p>
             <a:fld id="{DD6D9246-4FED-8E4D-BC9B-CDD794F2A5B7}" type="datetimeFigureOut">
               <a:rPr lang="en-US" smtClean="0"/>
-              <a:t>1/8/21</a:t>
+              <a:t>10/3/24</a:t>
             </a:fld>
             <a:endParaRPr lang="en-US"/>
           </a:p>
@@ -1821,7 +1821,7 @@
           <a:p>
             <a:fld id="{DD6D9246-4FED-8E4D-BC9B-CDD794F2A5B7}" type="datetimeFigureOut">
               <a:rPr lang="en-US" smtClean="0"/>
-              <a:t>1/8/21</a:t>
+              <a:t>10/3/24</a:t>
             </a:fld>
             <a:endParaRPr lang="en-US"/>
           </a:p>
@@ -2098,7 +2098,7 @@
           <a:p>
             <a:fld id="{DD6D9246-4FED-8E4D-BC9B-CDD794F2A5B7}" type="datetimeFigureOut">
               <a:rPr lang="en-US" smtClean="0"/>
-              <a:t>1/8/21</a:t>
+              <a:t>10/3/24</a:t>
             </a:fld>
             <a:endParaRPr lang="en-US"/>
           </a:p>
@@ -2355,7 +2355,7 @@
           <a:p>
             <a:fld id="{DD6D9246-4FED-8E4D-BC9B-CDD794F2A5B7}" type="datetimeFigureOut">
               <a:rPr lang="en-US" smtClean="0"/>
-              <a:t>1/8/21</a:t>
+              <a:t>10/3/24</a:t>
             </a:fld>
             <a:endParaRPr lang="en-US"/>
           </a:p>
@@ -2568,7 +2568,7 @@
           <a:p>
             <a:fld id="{DD6D9246-4FED-8E4D-BC9B-CDD794F2A5B7}" type="datetimeFigureOut">
               <a:rPr lang="en-US" smtClean="0"/>
-              <a:t>1/8/21</a:t>
+              <a:t>10/3/24</a:t>
             </a:fld>
             <a:endParaRPr lang="en-US"/>
           </a:p>
@@ -3484,7 +3484,7 @@
                 </a:solidFill>
                 <a:latin typeface="Courier" pitchFamily="2" charset="0"/>
               </a:rPr>
-              <a:t>GT</a:t>
+              <a:t>GTA</a:t>
             </a:r>
           </a:p>
         </p:txBody>
@@ -3548,8 +3548,8 @@
         </p:nvCxnSpPr>
         <p:spPr>
           <a:xfrm>
-            <a:off x="9314568" y="1489207"/>
-            <a:ext cx="959315" cy="0"/>
+            <a:off x="9451818" y="1489207"/>
+            <a:ext cx="822065" cy="0"/>
           </a:xfrm>
           <a:prstGeom prst="line">
             <a:avLst/>
@@ -3678,7 +3678,7 @@
                 </a:solidFill>
                 <a:latin typeface="Courier" pitchFamily="2" charset="0"/>
               </a:rPr>
-              <a:t>GT</a:t>
+              <a:t>GTA</a:t>
             </a:r>
           </a:p>
         </p:txBody>
@@ -3742,8 +3742,8 @@
         </p:nvCxnSpPr>
         <p:spPr>
           <a:xfrm>
-            <a:off x="9330612" y="1911316"/>
-            <a:ext cx="943273" cy="0"/>
+            <a:off x="9451818" y="1911316"/>
+            <a:ext cx="822067" cy="0"/>
           </a:xfrm>
           <a:prstGeom prst="line">
             <a:avLst/>
@@ -3834,7 +3834,7 @@
           <a:p>
             <a:r>
               <a:rPr lang="en-US" dirty="0"/>
-              <a:t>33nt</a:t>
+              <a:t>34nt</a:t>
             </a:r>
           </a:p>
         </p:txBody>
@@ -3869,7 +3869,7 @@
           <a:p>
             <a:r>
               <a:rPr lang="en-US" dirty="0"/>
-              <a:t>33nt</a:t>
+              <a:t>34nt</a:t>
             </a:r>
           </a:p>
         </p:txBody>

</xml_diff>